<commit_message>
corrected mistake in powerpoint
</commit_message>
<xml_diff>
--- a/Rush Hour.pptx
+++ b/Rush Hour.pptx
@@ -124,7 +124,7 @@
   </p:defaultTextStyle>
   <p:extLst>
     <p:ext uri="{EFAFB233-063F-42B5-8137-9DF3F51BA10A}">
-      <p15:sldGuideLst xmlns:p15="http://schemas.microsoft.com/office/powerpoint/2012/main">
+      <p15:sldGuideLst xmlns:p15="http://schemas.microsoft.com/office/powerpoint/2012/main" xmlns="">
         <p15:guide id="1" orient="horz" pos="2160">
           <p15:clr>
             <a:srgbClr val="A4A3A4"/>
@@ -138,7 +138,7 @@
       </p15:sldGuideLst>
     </p:ext>
     <p:ext uri="{2D200454-40CA-4A62-9FC3-DE9A4176ACB9}">
-      <p15:notesGuideLst xmlns:p15="http://schemas.microsoft.com/office/powerpoint/2012/main"/>
+      <p15:notesGuideLst xmlns:p15="http://schemas.microsoft.com/office/powerpoint/2012/main" xmlns=""/>
     </p:ext>
   </p:extLst>
 </p:presentation>
@@ -307,7 +307,7 @@
     </p:spTree>
     <p:extLst>
       <p:ext uri="{BB962C8B-B14F-4D97-AF65-F5344CB8AC3E}">
-        <p14:creationId xmlns:p14="http://schemas.microsoft.com/office/powerpoint/2010/main" val="2733249305"/>
+        <p14:creationId xmlns:p14="http://schemas.microsoft.com/office/powerpoint/2010/main" xmlns="" val="2733249305"/>
       </p:ext>
     </p:extLst>
   </p:cSld>
@@ -570,7 +570,7 @@
     </p:spTree>
     <p:extLst>
       <p:ext uri="{BB962C8B-B14F-4D97-AF65-F5344CB8AC3E}">
-        <p14:creationId xmlns:p14="http://schemas.microsoft.com/office/powerpoint/2010/main" val="649258610"/>
+        <p14:creationId xmlns:p14="http://schemas.microsoft.com/office/powerpoint/2010/main" xmlns="" val="649258610"/>
       </p:ext>
     </p:extLst>
   </p:cSld>
@@ -747,7 +747,7 @@
     </p:spTree>
     <p:extLst>
       <p:ext uri="{BB962C8B-B14F-4D97-AF65-F5344CB8AC3E}">
-        <p14:creationId xmlns:p14="http://schemas.microsoft.com/office/powerpoint/2010/main" val="3859257745"/>
+        <p14:creationId xmlns:p14="http://schemas.microsoft.com/office/powerpoint/2010/main" xmlns="" val="3859257745"/>
       </p:ext>
     </p:extLst>
   </p:cSld>
@@ -834,7 +834,7 @@
     </p:spTree>
     <p:extLst>
       <p:ext uri="{BB962C8B-B14F-4D97-AF65-F5344CB8AC3E}">
-        <p14:creationId xmlns:p14="http://schemas.microsoft.com/office/powerpoint/2010/main" val="3959845782"/>
+        <p14:creationId xmlns:p14="http://schemas.microsoft.com/office/powerpoint/2010/main" xmlns="" val="3959845782"/>
       </p:ext>
     </p:extLst>
   </p:cSld>
@@ -921,7 +921,7 @@
     </p:spTree>
     <p:extLst>
       <p:ext uri="{BB962C8B-B14F-4D97-AF65-F5344CB8AC3E}">
-        <p14:creationId xmlns:p14="http://schemas.microsoft.com/office/powerpoint/2010/main" val="3959845782"/>
+        <p14:creationId xmlns:p14="http://schemas.microsoft.com/office/powerpoint/2010/main" xmlns="" val="3959845782"/>
       </p:ext>
     </p:extLst>
   </p:cSld>
@@ -21446,10 +21446,10 @@
           <p:cNvPr id="19" name="Rechthoek 18">
             <a:extLst>
               <a:ext uri="{FF2B5EF4-FFF2-40B4-BE49-F238E27FC236}">
-                <a16:creationId xmlns:a16="http://schemas.microsoft.com/office/drawing/2014/main" id="{2FDF0794-1B86-42B2-B8C7-F60123E638ED}"/>
+                <a16:creationId xmlns:a16="http://schemas.microsoft.com/office/drawing/2014/main" xmlns="" id="{2FDF0794-1B86-42B2-B8C7-F60123E638ED}"/>
               </a:ext>
               <a:ext uri="{C183D7F6-B498-43B3-948B-1728B52AA6E4}">
-                <adec:decorative xmlns:adec="http://schemas.microsoft.com/office/drawing/2017/decorative" val="1"/>
+                <adec:decorative xmlns:adec="http://schemas.microsoft.com/office/drawing/2017/decorative" xmlns="" val="1"/>
               </a:ext>
             </a:extLst>
           </p:cNvPr>
@@ -21459,7 +21459,7 @@
           <p:nvPr>
             <p:extLst>
               <p:ext uri="{386F3935-93C4-4BCD-93E2-E3B085C9AB24}">
-                <p16:designElem xmlns:p16="http://schemas.microsoft.com/office/powerpoint/2015/main" val="1"/>
+                <p16:designElem xmlns:p16="http://schemas.microsoft.com/office/powerpoint/2015/main" xmlns="" val="1"/>
               </p:ext>
             </p:extLst>
           </p:nvPr>
@@ -21509,10 +21509,10 @@
           <p:cNvPr id="5" name="Afbeelding 4">
             <a:extLst>
               <a:ext uri="{FF2B5EF4-FFF2-40B4-BE49-F238E27FC236}">
-                <a16:creationId xmlns:a16="http://schemas.microsoft.com/office/drawing/2014/main" id="{230BD1B1-AA22-48F1-B3ED-579CD284605D}"/>
+                <a16:creationId xmlns:a16="http://schemas.microsoft.com/office/drawing/2014/main" xmlns="" id="{230BD1B1-AA22-48F1-B3ED-579CD284605D}"/>
               </a:ext>
               <a:ext uri="{C183D7F6-B498-43B3-948B-1728B52AA6E4}">
-                <adec:decorative xmlns:adec="http://schemas.microsoft.com/office/drawing/2017/decorative" val="1"/>
+                <adec:decorative xmlns:adec="http://schemas.microsoft.com/office/drawing/2017/decorative" xmlns="" val="1"/>
               </a:ext>
             </a:extLst>
           </p:cNvPr>
@@ -21541,10 +21541,10 @@
           <p:cNvPr id="21" name="Rechthoek 20">
             <a:extLst>
               <a:ext uri="{FF2B5EF4-FFF2-40B4-BE49-F238E27FC236}">
-                <a16:creationId xmlns:a16="http://schemas.microsoft.com/office/drawing/2014/main" id="{EAA48FC5-3C83-4F1B-BC33-DF0B588F8317}"/>
+                <a16:creationId xmlns:a16="http://schemas.microsoft.com/office/drawing/2014/main" xmlns="" id="{EAA48FC5-3C83-4F1B-BC33-DF0B588F8317}"/>
               </a:ext>
               <a:ext uri="{C183D7F6-B498-43B3-948B-1728B52AA6E4}">
-                <adec:decorative xmlns:adec="http://schemas.microsoft.com/office/drawing/2017/decorative" val="1"/>
+                <adec:decorative xmlns:adec="http://schemas.microsoft.com/office/drawing/2017/decorative" xmlns="" val="1"/>
               </a:ext>
             </a:extLst>
           </p:cNvPr>
@@ -21554,7 +21554,7 @@
           <p:nvPr>
             <p:extLst>
               <p:ext uri="{386F3935-93C4-4BCD-93E2-E3B085C9AB24}">
-                <p16:designElem xmlns:p16="http://schemas.microsoft.com/office/powerpoint/2015/main" val="1"/>
+                <p16:designElem xmlns:p16="http://schemas.microsoft.com/office/powerpoint/2015/main" xmlns="" val="1"/>
               </p:ext>
             </p:extLst>
           </p:nvPr>
@@ -21604,7 +21604,7 @@
           <p:cNvPr id="2" name="Titel 1">
             <a:extLst>
               <a:ext uri="{FF2B5EF4-FFF2-40B4-BE49-F238E27FC236}">
-                <a16:creationId xmlns:a16="http://schemas.microsoft.com/office/drawing/2014/main" id="{DE3D84FB-5D02-47D2-98FD-4F01A02E2AEA}"/>
+                <a16:creationId xmlns:a16="http://schemas.microsoft.com/office/drawing/2014/main" xmlns="" id="{DE3D84FB-5D02-47D2-98FD-4F01A02E2AEA}"/>
               </a:ext>
             </a:extLst>
           </p:cNvPr>
@@ -21644,7 +21644,7 @@
           <p:cNvPr id="3" name="Subtitel 2">
             <a:extLst>
               <a:ext uri="{FF2B5EF4-FFF2-40B4-BE49-F238E27FC236}">
-                <a16:creationId xmlns:a16="http://schemas.microsoft.com/office/drawing/2014/main" id="{E9F6641D-ADF3-40BD-9BA3-E740E77C8826}"/>
+                <a16:creationId xmlns:a16="http://schemas.microsoft.com/office/drawing/2014/main" xmlns="" id="{E9F6641D-ADF3-40BD-9BA3-E740E77C8826}"/>
               </a:ext>
             </a:extLst>
           </p:cNvPr>
@@ -21684,10 +21684,10 @@
           <p:cNvPr id="23" name="Rechte verbindingslijn 22">
             <a:extLst>
               <a:ext uri="{FF2B5EF4-FFF2-40B4-BE49-F238E27FC236}">
-                <a16:creationId xmlns:a16="http://schemas.microsoft.com/office/drawing/2014/main" id="{62F01714-1A39-4194-BD47-8A9960C59985}"/>
+                <a16:creationId xmlns:a16="http://schemas.microsoft.com/office/drawing/2014/main" xmlns="" id="{62F01714-1A39-4194-BD47-8A9960C59985}"/>
               </a:ext>
               <a:ext uri="{C183D7F6-B498-43B3-948B-1728B52AA6E4}">
-                <adec:decorative xmlns:adec="http://schemas.microsoft.com/office/drawing/2017/decorative" val="1"/>
+                <adec:decorative xmlns:adec="http://schemas.microsoft.com/office/drawing/2017/decorative" xmlns="" val="1"/>
               </a:ext>
             </a:extLst>
           </p:cNvPr>
@@ -21697,7 +21697,7 @@
           <p:nvPr>
             <p:extLst>
               <p:ext uri="{386F3935-93C4-4BCD-93E2-E3B085C9AB24}">
-                <p16:designElem xmlns:p16="http://schemas.microsoft.com/office/powerpoint/2015/main" val="1"/>
+                <p16:designElem xmlns:p16="http://schemas.microsoft.com/office/powerpoint/2015/main" xmlns="" val="1"/>
               </p:ext>
             </p:extLst>
           </p:nvPr>
@@ -21734,7 +21734,7 @@
     </p:spTree>
     <p:extLst>
       <p:ext uri="{BB962C8B-B14F-4D97-AF65-F5344CB8AC3E}">
-        <p14:creationId xmlns:p14="http://schemas.microsoft.com/office/powerpoint/2010/main" val="2806257027"/>
+        <p14:creationId xmlns:p14="http://schemas.microsoft.com/office/powerpoint/2010/main" xmlns="" val="2806257027"/>
       </p:ext>
     </p:extLst>
   </p:cSld>
@@ -21807,21 +21807,21 @@
                 <a:gridCol w="1822550">
                   <a:extLst>
                     <a:ext uri="{9D8B030D-6E8A-4147-A177-3AD203B41FA5}">
-                      <a16:colId xmlns:a16="http://schemas.microsoft.com/office/drawing/2014/main" val="20000"/>
+                      <a16:colId xmlns:a16="http://schemas.microsoft.com/office/drawing/2014/main" xmlns="" val="20000"/>
                     </a:ext>
                   </a:extLst>
                 </a:gridCol>
                 <a:gridCol w="1822550">
                   <a:extLst>
                     <a:ext uri="{9D8B030D-6E8A-4147-A177-3AD203B41FA5}">
-                      <a16:colId xmlns:a16="http://schemas.microsoft.com/office/drawing/2014/main" val="20001"/>
+                      <a16:colId xmlns:a16="http://schemas.microsoft.com/office/drawing/2014/main" xmlns="" val="20001"/>
                     </a:ext>
                   </a:extLst>
                 </a:gridCol>
                 <a:gridCol w="1822550">
                   <a:extLst>
                     <a:ext uri="{9D8B030D-6E8A-4147-A177-3AD203B41FA5}">
-                      <a16:colId xmlns:a16="http://schemas.microsoft.com/office/drawing/2014/main" val="20002"/>
+                      <a16:colId xmlns:a16="http://schemas.microsoft.com/office/drawing/2014/main" xmlns="" val="20002"/>
                     </a:ext>
                   </a:extLst>
                 </a:gridCol>
@@ -21865,7 +21865,7 @@
                 </a:tc>
                 <a:extLst>
                   <a:ext uri="{0D108BD9-81ED-4DB2-BD59-A6C34878D82A}">
-                    <a16:rowId xmlns:a16="http://schemas.microsoft.com/office/drawing/2014/main" val="10000"/>
+                    <a16:rowId xmlns:a16="http://schemas.microsoft.com/office/drawing/2014/main" xmlns="" val="10000"/>
                   </a:ext>
                 </a:extLst>
               </a:tr>
@@ -21911,7 +21911,7 @@
                 </a:tc>
                 <a:extLst>
                   <a:ext uri="{0D108BD9-81ED-4DB2-BD59-A6C34878D82A}">
-                    <a16:rowId xmlns:a16="http://schemas.microsoft.com/office/drawing/2014/main" val="10001"/>
+                    <a16:rowId xmlns:a16="http://schemas.microsoft.com/office/drawing/2014/main" xmlns="" val="10001"/>
                   </a:ext>
                 </a:extLst>
               </a:tr>
@@ -21957,7 +21957,7 @@
                 </a:tc>
                 <a:extLst>
                   <a:ext uri="{0D108BD9-81ED-4DB2-BD59-A6C34878D82A}">
-                    <a16:rowId xmlns:a16="http://schemas.microsoft.com/office/drawing/2014/main" val="10002"/>
+                    <a16:rowId xmlns:a16="http://schemas.microsoft.com/office/drawing/2014/main" xmlns="" val="10002"/>
                   </a:ext>
                 </a:extLst>
               </a:tr>
@@ -22011,7 +22011,7 @@
                 </a:tc>
                 <a:extLst>
                   <a:ext uri="{0D108BD9-81ED-4DB2-BD59-A6C34878D82A}">
-                    <a16:rowId xmlns:a16="http://schemas.microsoft.com/office/drawing/2014/main" val="10003"/>
+                    <a16:rowId xmlns:a16="http://schemas.microsoft.com/office/drawing/2014/main" xmlns="" val="10003"/>
                   </a:ext>
                 </a:extLst>
               </a:tr>
@@ -22057,7 +22057,7 @@
                 </a:tc>
                 <a:extLst>
                   <a:ext uri="{0D108BD9-81ED-4DB2-BD59-A6C34878D82A}">
-                    <a16:rowId xmlns:a16="http://schemas.microsoft.com/office/drawing/2014/main" val="10004"/>
+                    <a16:rowId xmlns:a16="http://schemas.microsoft.com/office/drawing/2014/main" xmlns="" val="10004"/>
                   </a:ext>
                 </a:extLst>
               </a:tr>
@@ -22103,7 +22103,7 @@
                 </a:tc>
                 <a:extLst>
                   <a:ext uri="{0D108BD9-81ED-4DB2-BD59-A6C34878D82A}">
-                    <a16:rowId xmlns:a16="http://schemas.microsoft.com/office/drawing/2014/main" val="10005"/>
+                    <a16:rowId xmlns:a16="http://schemas.microsoft.com/office/drawing/2014/main" xmlns="" val="10005"/>
                   </a:ext>
                 </a:extLst>
               </a:tr>
@@ -22149,7 +22149,7 @@
                 </a:tc>
                 <a:extLst>
                   <a:ext uri="{0D108BD9-81ED-4DB2-BD59-A6C34878D82A}">
-                    <a16:rowId xmlns:a16="http://schemas.microsoft.com/office/drawing/2014/main" val="10006"/>
+                    <a16:rowId xmlns:a16="http://schemas.microsoft.com/office/drawing/2014/main" xmlns="" val="10006"/>
                   </a:ext>
                 </a:extLst>
               </a:tr>
@@ -22195,7 +22195,7 @@
                 </a:tc>
                 <a:extLst>
                   <a:ext uri="{0D108BD9-81ED-4DB2-BD59-A6C34878D82A}">
-                    <a16:rowId xmlns:a16="http://schemas.microsoft.com/office/drawing/2014/main" val="10007"/>
+                    <a16:rowId xmlns:a16="http://schemas.microsoft.com/office/drawing/2014/main" xmlns="" val="10007"/>
                   </a:ext>
                 </a:extLst>
               </a:tr>
@@ -22225,21 +22225,21 @@
                 <a:gridCol w="1822550">
                   <a:extLst>
                     <a:ext uri="{9D8B030D-6E8A-4147-A177-3AD203B41FA5}">
-                      <a16:colId xmlns:a16="http://schemas.microsoft.com/office/drawing/2014/main" val="20000"/>
+                      <a16:colId xmlns:a16="http://schemas.microsoft.com/office/drawing/2014/main" xmlns="" val="20000"/>
                     </a:ext>
                   </a:extLst>
                 </a:gridCol>
                 <a:gridCol w="1822550">
                   <a:extLst>
                     <a:ext uri="{9D8B030D-6E8A-4147-A177-3AD203B41FA5}">
-                      <a16:colId xmlns:a16="http://schemas.microsoft.com/office/drawing/2014/main" val="20001"/>
+                      <a16:colId xmlns:a16="http://schemas.microsoft.com/office/drawing/2014/main" xmlns="" val="20001"/>
                     </a:ext>
                   </a:extLst>
                 </a:gridCol>
                 <a:gridCol w="1822550">
                   <a:extLst>
                     <a:ext uri="{9D8B030D-6E8A-4147-A177-3AD203B41FA5}">
-                      <a16:colId xmlns:a16="http://schemas.microsoft.com/office/drawing/2014/main" val="20002"/>
+                      <a16:colId xmlns:a16="http://schemas.microsoft.com/office/drawing/2014/main" xmlns="" val="20002"/>
                     </a:ext>
                   </a:extLst>
                 </a:gridCol>
@@ -22283,7 +22283,7 @@
                 </a:tc>
                 <a:extLst>
                   <a:ext uri="{0D108BD9-81ED-4DB2-BD59-A6C34878D82A}">
-                    <a16:rowId xmlns:a16="http://schemas.microsoft.com/office/drawing/2014/main" val="10000"/>
+                    <a16:rowId xmlns:a16="http://schemas.microsoft.com/office/drawing/2014/main" xmlns="" val="10000"/>
                   </a:ext>
                 </a:extLst>
               </a:tr>
@@ -22334,7 +22334,7 @@
                 </a:tc>
                 <a:extLst>
                   <a:ext uri="{0D108BD9-81ED-4DB2-BD59-A6C34878D82A}">
-                    <a16:rowId xmlns:a16="http://schemas.microsoft.com/office/drawing/2014/main" val="10001"/>
+                    <a16:rowId xmlns:a16="http://schemas.microsoft.com/office/drawing/2014/main" xmlns="" val="10001"/>
                   </a:ext>
                 </a:extLst>
               </a:tr>
@@ -22385,7 +22385,7 @@
                 </a:tc>
                 <a:extLst>
                   <a:ext uri="{0D108BD9-81ED-4DB2-BD59-A6C34878D82A}">
-                    <a16:rowId xmlns:a16="http://schemas.microsoft.com/office/drawing/2014/main" val="10002"/>
+                    <a16:rowId xmlns:a16="http://schemas.microsoft.com/office/drawing/2014/main" xmlns="" val="10002"/>
                   </a:ext>
                 </a:extLst>
               </a:tr>
@@ -22444,7 +22444,7 @@
                 </a:tc>
                 <a:extLst>
                   <a:ext uri="{0D108BD9-81ED-4DB2-BD59-A6C34878D82A}">
-                    <a16:rowId xmlns:a16="http://schemas.microsoft.com/office/drawing/2014/main" val="10003"/>
+                    <a16:rowId xmlns:a16="http://schemas.microsoft.com/office/drawing/2014/main" xmlns="" val="10003"/>
                   </a:ext>
                 </a:extLst>
               </a:tr>
@@ -22503,7 +22503,7 @@
                 </a:tc>
                 <a:extLst>
                   <a:ext uri="{0D108BD9-81ED-4DB2-BD59-A6C34878D82A}">
-                    <a16:rowId xmlns:a16="http://schemas.microsoft.com/office/drawing/2014/main" val="10004"/>
+                    <a16:rowId xmlns:a16="http://schemas.microsoft.com/office/drawing/2014/main" xmlns="" val="10004"/>
                   </a:ext>
                 </a:extLst>
               </a:tr>
@@ -22549,7 +22549,7 @@
                 </a:tc>
                 <a:extLst>
                   <a:ext uri="{0D108BD9-81ED-4DB2-BD59-A6C34878D82A}">
-                    <a16:rowId xmlns:a16="http://schemas.microsoft.com/office/drawing/2014/main" val="10005"/>
+                    <a16:rowId xmlns:a16="http://schemas.microsoft.com/office/drawing/2014/main" xmlns="" val="10005"/>
                   </a:ext>
                 </a:extLst>
               </a:tr>
@@ -22603,7 +22603,7 @@
                 </a:tc>
                 <a:extLst>
                   <a:ext uri="{0D108BD9-81ED-4DB2-BD59-A6C34878D82A}">
-                    <a16:rowId xmlns:a16="http://schemas.microsoft.com/office/drawing/2014/main" val="10006"/>
+                    <a16:rowId xmlns:a16="http://schemas.microsoft.com/office/drawing/2014/main" xmlns="" val="10006"/>
                   </a:ext>
                 </a:extLst>
               </a:tr>
@@ -22649,7 +22649,7 @@
                 </a:tc>
                 <a:extLst>
                   <a:ext uri="{0D108BD9-81ED-4DB2-BD59-A6C34878D82A}">
-                    <a16:rowId xmlns:a16="http://schemas.microsoft.com/office/drawing/2014/main" val="10007"/>
+                    <a16:rowId xmlns:a16="http://schemas.microsoft.com/office/drawing/2014/main" xmlns="" val="10007"/>
                   </a:ext>
                 </a:extLst>
               </a:tr>
@@ -22847,28 +22847,28 @@
                 <a:gridCol w="2245918">
                   <a:extLst>
                     <a:ext uri="{9D8B030D-6E8A-4147-A177-3AD203B41FA5}">
-                      <a16:colId xmlns:a16="http://schemas.microsoft.com/office/drawing/2014/main" val="20000"/>
+                      <a16:colId xmlns:a16="http://schemas.microsoft.com/office/drawing/2014/main" xmlns="" val="20000"/>
                     </a:ext>
                   </a:extLst>
                 </a:gridCol>
                 <a:gridCol w="2245918">
                   <a:extLst>
                     <a:ext uri="{9D8B030D-6E8A-4147-A177-3AD203B41FA5}">
-                      <a16:colId xmlns:a16="http://schemas.microsoft.com/office/drawing/2014/main" val="20001"/>
+                      <a16:colId xmlns:a16="http://schemas.microsoft.com/office/drawing/2014/main" xmlns="" val="20001"/>
                     </a:ext>
                   </a:extLst>
                 </a:gridCol>
                 <a:gridCol w="2245918">
                   <a:extLst>
                     <a:ext uri="{9D8B030D-6E8A-4147-A177-3AD203B41FA5}">
-                      <a16:colId xmlns:a16="http://schemas.microsoft.com/office/drawing/2014/main" val="20002"/>
+                      <a16:colId xmlns:a16="http://schemas.microsoft.com/office/drawing/2014/main" xmlns="" val="20002"/>
                     </a:ext>
                   </a:extLst>
                 </a:gridCol>
                 <a:gridCol w="2245918">
                   <a:extLst>
                     <a:ext uri="{9D8B030D-6E8A-4147-A177-3AD203B41FA5}">
-                      <a16:colId xmlns:a16="http://schemas.microsoft.com/office/drawing/2014/main" val="20003"/>
+                      <a16:colId xmlns:a16="http://schemas.microsoft.com/office/drawing/2014/main" xmlns="" val="20003"/>
                     </a:ext>
                   </a:extLst>
                 </a:gridCol>
@@ -22925,7 +22925,7 @@
                 </a:tc>
                 <a:extLst>
                   <a:ext uri="{0D108BD9-81ED-4DB2-BD59-A6C34878D82A}">
-                    <a16:rowId xmlns:a16="http://schemas.microsoft.com/office/drawing/2014/main" val="10000"/>
+                    <a16:rowId xmlns:a16="http://schemas.microsoft.com/office/drawing/2014/main" xmlns="" val="10000"/>
                   </a:ext>
                 </a:extLst>
               </a:tr>
@@ -22989,7 +22989,7 @@
                 </a:tc>
                 <a:extLst>
                   <a:ext uri="{0D108BD9-81ED-4DB2-BD59-A6C34878D82A}">
-                    <a16:rowId xmlns:a16="http://schemas.microsoft.com/office/drawing/2014/main" val="10001"/>
+                    <a16:rowId xmlns:a16="http://schemas.microsoft.com/office/drawing/2014/main" xmlns="" val="10001"/>
                   </a:ext>
                 </a:extLst>
               </a:tr>
@@ -23053,7 +23053,7 @@
                 </a:tc>
                 <a:extLst>
                   <a:ext uri="{0D108BD9-81ED-4DB2-BD59-A6C34878D82A}">
-                    <a16:rowId xmlns:a16="http://schemas.microsoft.com/office/drawing/2014/main" val="10002"/>
+                    <a16:rowId xmlns:a16="http://schemas.microsoft.com/office/drawing/2014/main" xmlns="" val="10002"/>
                   </a:ext>
                 </a:extLst>
               </a:tr>
@@ -23125,7 +23125,7 @@
                 </a:tc>
                 <a:extLst>
                   <a:ext uri="{0D108BD9-81ED-4DB2-BD59-A6C34878D82A}">
-                    <a16:rowId xmlns:a16="http://schemas.microsoft.com/office/drawing/2014/main" val="10003"/>
+                    <a16:rowId xmlns:a16="http://schemas.microsoft.com/office/drawing/2014/main" xmlns="" val="10003"/>
                   </a:ext>
                 </a:extLst>
               </a:tr>
@@ -23184,7 +23184,7 @@
                 </a:tc>
                 <a:extLst>
                   <a:ext uri="{0D108BD9-81ED-4DB2-BD59-A6C34878D82A}">
-                    <a16:rowId xmlns:a16="http://schemas.microsoft.com/office/drawing/2014/main" val="10004"/>
+                    <a16:rowId xmlns:a16="http://schemas.microsoft.com/office/drawing/2014/main" xmlns="" val="10004"/>
                   </a:ext>
                 </a:extLst>
               </a:tr>
@@ -23248,7 +23248,7 @@
                 </a:tc>
                 <a:extLst>
                   <a:ext uri="{0D108BD9-81ED-4DB2-BD59-A6C34878D82A}">
-                    <a16:rowId xmlns:a16="http://schemas.microsoft.com/office/drawing/2014/main" val="10005"/>
+                    <a16:rowId xmlns:a16="http://schemas.microsoft.com/office/drawing/2014/main" xmlns="" val="10005"/>
                   </a:ext>
                 </a:extLst>
               </a:tr>
@@ -23317,7 +23317,7 @@
                 </a:tc>
                 <a:extLst>
                   <a:ext uri="{0D108BD9-81ED-4DB2-BD59-A6C34878D82A}">
-                    <a16:rowId xmlns:a16="http://schemas.microsoft.com/office/drawing/2014/main" val="10006"/>
+                    <a16:rowId xmlns:a16="http://schemas.microsoft.com/office/drawing/2014/main" xmlns="" val="10006"/>
                   </a:ext>
                 </a:extLst>
               </a:tr>
@@ -23522,7 +23522,7 @@
           <p:nvPr>
             <p:extLst>
               <p:ext uri="{D42A27DB-BD31-4B8C-83A1-F6EECF244321}">
-                <p14:modId xmlns:p14="http://schemas.microsoft.com/office/powerpoint/2010/main" val="498934112"/>
+                <p14:modId xmlns:p14="http://schemas.microsoft.com/office/powerpoint/2010/main" xmlns="" val="498934112"/>
               </p:ext>
             </p:extLst>
           </p:nvPr>
@@ -23541,21 +23541,21 @@
                 <a:gridCol w="1822550">
                   <a:extLst>
                     <a:ext uri="{9D8B030D-6E8A-4147-A177-3AD203B41FA5}">
-                      <a16:colId xmlns:a16="http://schemas.microsoft.com/office/drawing/2014/main" val="20000"/>
+                      <a16:colId xmlns:a16="http://schemas.microsoft.com/office/drawing/2014/main" xmlns="" val="20000"/>
                     </a:ext>
                   </a:extLst>
                 </a:gridCol>
                 <a:gridCol w="1822550">
                   <a:extLst>
                     <a:ext uri="{9D8B030D-6E8A-4147-A177-3AD203B41FA5}">
-                      <a16:colId xmlns:a16="http://schemas.microsoft.com/office/drawing/2014/main" val="20001"/>
+                      <a16:colId xmlns:a16="http://schemas.microsoft.com/office/drawing/2014/main" xmlns="" val="20001"/>
                     </a:ext>
                   </a:extLst>
                 </a:gridCol>
                 <a:gridCol w="1822550">
                   <a:extLst>
                     <a:ext uri="{9D8B030D-6E8A-4147-A177-3AD203B41FA5}">
-                      <a16:colId xmlns:a16="http://schemas.microsoft.com/office/drawing/2014/main" val="20002"/>
+                      <a16:colId xmlns:a16="http://schemas.microsoft.com/office/drawing/2014/main" xmlns="" val="20002"/>
                     </a:ext>
                   </a:extLst>
                 </a:gridCol>
@@ -23604,7 +23604,7 @@
                 </a:tc>
                 <a:extLst>
                   <a:ext uri="{0D108BD9-81ED-4DB2-BD59-A6C34878D82A}">
-                    <a16:rowId xmlns:a16="http://schemas.microsoft.com/office/drawing/2014/main" val="10000"/>
+                    <a16:rowId xmlns:a16="http://schemas.microsoft.com/office/drawing/2014/main" xmlns="" val="10000"/>
                   </a:ext>
                 </a:extLst>
               </a:tr>
@@ -23655,7 +23655,7 @@
                 </a:tc>
                 <a:extLst>
                   <a:ext uri="{0D108BD9-81ED-4DB2-BD59-A6C34878D82A}">
-                    <a16:rowId xmlns:a16="http://schemas.microsoft.com/office/drawing/2014/main" val="10001"/>
+                    <a16:rowId xmlns:a16="http://schemas.microsoft.com/office/drawing/2014/main" xmlns="" val="10001"/>
                   </a:ext>
                 </a:extLst>
               </a:tr>
@@ -23706,7 +23706,7 @@
                 </a:tc>
                 <a:extLst>
                   <a:ext uri="{0D108BD9-81ED-4DB2-BD59-A6C34878D82A}">
-                    <a16:rowId xmlns:a16="http://schemas.microsoft.com/office/drawing/2014/main" val="10002"/>
+                    <a16:rowId xmlns:a16="http://schemas.microsoft.com/office/drawing/2014/main" xmlns="" val="10002"/>
                   </a:ext>
                 </a:extLst>
               </a:tr>
@@ -23765,7 +23765,7 @@
                 </a:tc>
                 <a:extLst>
                   <a:ext uri="{0D108BD9-81ED-4DB2-BD59-A6C34878D82A}">
-                    <a16:rowId xmlns:a16="http://schemas.microsoft.com/office/drawing/2014/main" val="10003"/>
+                    <a16:rowId xmlns:a16="http://schemas.microsoft.com/office/drawing/2014/main" xmlns="" val="10003"/>
                   </a:ext>
                 </a:extLst>
               </a:tr>
@@ -23824,7 +23824,7 @@
                 </a:tc>
                 <a:extLst>
                   <a:ext uri="{0D108BD9-81ED-4DB2-BD59-A6C34878D82A}">
-                    <a16:rowId xmlns:a16="http://schemas.microsoft.com/office/drawing/2014/main" val="10004"/>
+                    <a16:rowId xmlns:a16="http://schemas.microsoft.com/office/drawing/2014/main" xmlns="" val="10004"/>
                   </a:ext>
                 </a:extLst>
               </a:tr>
@@ -23870,7 +23870,7 @@
                 </a:tc>
                 <a:extLst>
                   <a:ext uri="{0D108BD9-81ED-4DB2-BD59-A6C34878D82A}">
-                    <a16:rowId xmlns:a16="http://schemas.microsoft.com/office/drawing/2014/main" val="10005"/>
+                    <a16:rowId xmlns:a16="http://schemas.microsoft.com/office/drawing/2014/main" xmlns="" val="10005"/>
                   </a:ext>
                 </a:extLst>
               </a:tr>
@@ -23924,7 +23924,7 @@
                 </a:tc>
                 <a:extLst>
                   <a:ext uri="{0D108BD9-81ED-4DB2-BD59-A6C34878D82A}">
-                    <a16:rowId xmlns:a16="http://schemas.microsoft.com/office/drawing/2014/main" val="10006"/>
+                    <a16:rowId xmlns:a16="http://schemas.microsoft.com/office/drawing/2014/main" xmlns="" val="10006"/>
                   </a:ext>
                 </a:extLst>
               </a:tr>
@@ -23971,7 +23971,7 @@
                 </a:tc>
                 <a:extLst>
                   <a:ext uri="{0D108BD9-81ED-4DB2-BD59-A6C34878D82A}">
-                    <a16:rowId xmlns:a16="http://schemas.microsoft.com/office/drawing/2014/main" val="10007"/>
+                    <a16:rowId xmlns:a16="http://schemas.microsoft.com/office/drawing/2014/main" xmlns="" val="10007"/>
                   </a:ext>
                 </a:extLst>
               </a:tr>
@@ -24030,21 +24030,21 @@
                 <a:gridCol w="1809750">
                   <a:extLst>
                     <a:ext uri="{9D8B030D-6E8A-4147-A177-3AD203B41FA5}">
-                      <a16:colId xmlns:a16="http://schemas.microsoft.com/office/drawing/2014/main" val="20000"/>
+                      <a16:colId xmlns:a16="http://schemas.microsoft.com/office/drawing/2014/main" xmlns="" val="20000"/>
                     </a:ext>
                   </a:extLst>
                 </a:gridCol>
                 <a:gridCol w="1809750">
                   <a:extLst>
                     <a:ext uri="{9D8B030D-6E8A-4147-A177-3AD203B41FA5}">
-                      <a16:colId xmlns:a16="http://schemas.microsoft.com/office/drawing/2014/main" val="20001"/>
+                      <a16:colId xmlns:a16="http://schemas.microsoft.com/office/drawing/2014/main" xmlns="" val="20001"/>
                     </a:ext>
                   </a:extLst>
                 </a:gridCol>
                 <a:gridCol w="1809750">
                   <a:extLst>
                     <a:ext uri="{9D8B030D-6E8A-4147-A177-3AD203B41FA5}">
-                      <a16:colId xmlns:a16="http://schemas.microsoft.com/office/drawing/2014/main" val="20002"/>
+                      <a16:colId xmlns:a16="http://schemas.microsoft.com/office/drawing/2014/main" xmlns="" val="20002"/>
                     </a:ext>
                   </a:extLst>
                 </a:gridCol>
@@ -24088,7 +24088,7 @@
                 </a:tc>
                 <a:extLst>
                   <a:ext uri="{0D108BD9-81ED-4DB2-BD59-A6C34878D82A}">
-                    <a16:rowId xmlns:a16="http://schemas.microsoft.com/office/drawing/2014/main" val="10000"/>
+                    <a16:rowId xmlns:a16="http://schemas.microsoft.com/office/drawing/2014/main" xmlns="" val="10000"/>
                   </a:ext>
                 </a:extLst>
               </a:tr>
@@ -24139,7 +24139,7 @@
                 </a:tc>
                 <a:extLst>
                   <a:ext uri="{0D108BD9-81ED-4DB2-BD59-A6C34878D82A}">
-                    <a16:rowId xmlns:a16="http://schemas.microsoft.com/office/drawing/2014/main" val="10001"/>
+                    <a16:rowId xmlns:a16="http://schemas.microsoft.com/office/drawing/2014/main" xmlns="" val="10001"/>
                   </a:ext>
                 </a:extLst>
               </a:tr>
@@ -24190,7 +24190,7 @@
                 </a:tc>
                 <a:extLst>
                   <a:ext uri="{0D108BD9-81ED-4DB2-BD59-A6C34878D82A}">
-                    <a16:rowId xmlns:a16="http://schemas.microsoft.com/office/drawing/2014/main" val="10002"/>
+                    <a16:rowId xmlns:a16="http://schemas.microsoft.com/office/drawing/2014/main" xmlns="" val="10002"/>
                   </a:ext>
                 </a:extLst>
               </a:tr>
@@ -24249,7 +24249,7 @@
                 </a:tc>
                 <a:extLst>
                   <a:ext uri="{0D108BD9-81ED-4DB2-BD59-A6C34878D82A}">
-                    <a16:rowId xmlns:a16="http://schemas.microsoft.com/office/drawing/2014/main" val="10003"/>
+                    <a16:rowId xmlns:a16="http://schemas.microsoft.com/office/drawing/2014/main" xmlns="" val="10003"/>
                   </a:ext>
                 </a:extLst>
               </a:tr>
@@ -24295,7 +24295,7 @@
                 </a:tc>
                 <a:extLst>
                   <a:ext uri="{0D108BD9-81ED-4DB2-BD59-A6C34878D82A}">
-                    <a16:rowId xmlns:a16="http://schemas.microsoft.com/office/drawing/2014/main" val="10004"/>
+                    <a16:rowId xmlns:a16="http://schemas.microsoft.com/office/drawing/2014/main" xmlns="" val="10004"/>
                   </a:ext>
                 </a:extLst>
               </a:tr>
@@ -24346,7 +24346,7 @@
                 </a:tc>
                 <a:extLst>
                   <a:ext uri="{0D108BD9-81ED-4DB2-BD59-A6C34878D82A}">
-                    <a16:rowId xmlns:a16="http://schemas.microsoft.com/office/drawing/2014/main" val="10005"/>
+                    <a16:rowId xmlns:a16="http://schemas.microsoft.com/office/drawing/2014/main" xmlns="" val="10005"/>
                   </a:ext>
                 </a:extLst>
               </a:tr>
@@ -24402,7 +24402,7 @@
                 </a:tc>
                 <a:extLst>
                   <a:ext uri="{0D108BD9-81ED-4DB2-BD59-A6C34878D82A}">
-                    <a16:rowId xmlns:a16="http://schemas.microsoft.com/office/drawing/2014/main" val="10006"/>
+                    <a16:rowId xmlns:a16="http://schemas.microsoft.com/office/drawing/2014/main" xmlns="" val="10006"/>
                   </a:ext>
                 </a:extLst>
               </a:tr>
@@ -24448,7 +24448,7 @@
                 </a:tc>
                 <a:extLst>
                   <a:ext uri="{0D108BD9-81ED-4DB2-BD59-A6C34878D82A}">
-                    <a16:rowId xmlns:a16="http://schemas.microsoft.com/office/drawing/2014/main" val="10007"/>
+                    <a16:rowId xmlns:a16="http://schemas.microsoft.com/office/drawing/2014/main" xmlns="" val="10007"/>
                   </a:ext>
                 </a:extLst>
               </a:tr>
@@ -24515,7 +24515,7 @@
           <p:cNvPr id="2" name="Title 1">
             <a:extLst>
               <a:ext uri="{FF2B5EF4-FFF2-40B4-BE49-F238E27FC236}">
-                <a16:creationId xmlns:a16="http://schemas.microsoft.com/office/drawing/2014/main" id="{A29E2DD8-5C4F-47B3-AA74-36E634C6EDD9}"/>
+                <a16:creationId xmlns:a16="http://schemas.microsoft.com/office/drawing/2014/main" xmlns="" id="{A29E2DD8-5C4F-47B3-AA74-36E634C6EDD9}"/>
               </a:ext>
             </a:extLst>
           </p:cNvPr>
@@ -24544,7 +24544,7 @@
           <p:cNvPr id="3" name="Content Placeholder 2">
             <a:extLst>
               <a:ext uri="{FF2B5EF4-FFF2-40B4-BE49-F238E27FC236}">
-                <a16:creationId xmlns:a16="http://schemas.microsoft.com/office/drawing/2014/main" id="{C7B4D76D-D9F0-449D-8055-EAC7B066A3CF}"/>
+                <a16:creationId xmlns:a16="http://schemas.microsoft.com/office/drawing/2014/main" xmlns="" id="{C7B4D76D-D9F0-449D-8055-EAC7B066A3CF}"/>
               </a:ext>
             </a:extLst>
           </p:cNvPr>
@@ -24624,7 +24624,7 @@
     </p:spTree>
     <p:extLst>
       <p:ext uri="{BB962C8B-B14F-4D97-AF65-F5344CB8AC3E}">
-        <p14:creationId xmlns:p14="http://schemas.microsoft.com/office/powerpoint/2010/main" val="2330282233"/>
+        <p14:creationId xmlns:p14="http://schemas.microsoft.com/office/powerpoint/2010/main" xmlns="" val="2330282233"/>
       </p:ext>
     </p:extLst>
   </p:cSld>
@@ -24664,7 +24664,7 @@
           <p:cNvPr id="2" name="Titel 1">
             <a:extLst>
               <a:ext uri="{FF2B5EF4-FFF2-40B4-BE49-F238E27FC236}">
-                <a16:creationId xmlns:a16="http://schemas.microsoft.com/office/drawing/2014/main" id="{7A4919D0-F177-4BBA-9A0B-DBA69E2ED764}"/>
+                <a16:creationId xmlns:a16="http://schemas.microsoft.com/office/drawing/2014/main" xmlns="" id="{7A4919D0-F177-4BBA-9A0B-DBA69E2ED764}"/>
               </a:ext>
             </a:extLst>
           </p:cNvPr>
@@ -24782,7 +24782,7 @@
     </p:spTree>
     <p:extLst>
       <p:ext uri="{BB962C8B-B14F-4D97-AF65-F5344CB8AC3E}">
-        <p14:creationId xmlns:p14="http://schemas.microsoft.com/office/powerpoint/2010/main" val="1401741552"/>
+        <p14:creationId xmlns:p14="http://schemas.microsoft.com/office/powerpoint/2010/main" xmlns="" val="1401741552"/>
       </p:ext>
     </p:extLst>
   </p:cSld>
@@ -24822,7 +24822,7 @@
           <p:cNvPr id="2" name="Titel 1">
             <a:extLst>
               <a:ext uri="{FF2B5EF4-FFF2-40B4-BE49-F238E27FC236}">
-                <a16:creationId xmlns:a16="http://schemas.microsoft.com/office/drawing/2014/main" id="{7A4919D0-F177-4BBA-9A0B-DBA69E2ED764}"/>
+                <a16:creationId xmlns:a16="http://schemas.microsoft.com/office/drawing/2014/main" xmlns="" id="{7A4919D0-F177-4BBA-9A0B-DBA69E2ED764}"/>
               </a:ext>
             </a:extLst>
           </p:cNvPr>
@@ -24946,7 +24946,7 @@
     </p:spTree>
     <p:extLst>
       <p:ext uri="{BB962C8B-B14F-4D97-AF65-F5344CB8AC3E}">
-        <p14:creationId xmlns:p14="http://schemas.microsoft.com/office/powerpoint/2010/main" val="1401741552"/>
+        <p14:creationId xmlns:p14="http://schemas.microsoft.com/office/powerpoint/2010/main" xmlns="" val="1401741552"/>
       </p:ext>
     </p:extLst>
   </p:cSld>
@@ -24978,7 +24978,7 @@
           <p:cNvPr id="2" name="Title 1">
             <a:extLst>
               <a:ext uri="{FF2B5EF4-FFF2-40B4-BE49-F238E27FC236}">
-                <a16:creationId xmlns:a16="http://schemas.microsoft.com/office/drawing/2014/main" id="{185C28A2-74C0-4AEF-B007-134A142DE226}"/>
+                <a16:creationId xmlns:a16="http://schemas.microsoft.com/office/drawing/2014/main" xmlns="" id="{185C28A2-74C0-4AEF-B007-134A142DE226}"/>
               </a:ext>
             </a:extLst>
           </p:cNvPr>
@@ -25003,7 +25003,7 @@
           <p:cNvPr id="1026" name="Picture 2" descr="Afbeeldingsresultaat voor 9x9 rushhour">
             <a:extLst>
               <a:ext uri="{FF2B5EF4-FFF2-40B4-BE49-F238E27FC236}">
-                <a16:creationId xmlns:a16="http://schemas.microsoft.com/office/drawing/2014/main" id="{4EFCF1F0-FD0E-4F4D-8A26-2F632C6C8DF3}"/>
+                <a16:creationId xmlns:a16="http://schemas.microsoft.com/office/drawing/2014/main" xmlns="" id="{4EFCF1F0-FD0E-4F4D-8A26-2F632C6C8DF3}"/>
               </a:ext>
             </a:extLst>
           </p:cNvPr>
@@ -25018,7 +25018,7 @@
           <a:blip r:embed="rId2">
             <a:extLst>
               <a:ext uri="{28A0092B-C50C-407E-A947-70E740481C1C}">
-                <a14:useLocalDpi xmlns:a14="http://schemas.microsoft.com/office/drawing/2010/main" val="0"/>
+                <a14:useLocalDpi xmlns:a14="http://schemas.microsoft.com/office/drawing/2010/main" xmlns="" val="0"/>
               </a:ext>
             </a:extLst>
           </a:blip>
@@ -25038,7 +25038,7 @@
           <a:noFill/>
           <a:extLst>
             <a:ext uri="{909E8E84-426E-40DD-AFC4-6F175D3DCCD1}">
-              <a14:hiddenFill xmlns:a14="http://schemas.microsoft.com/office/drawing/2010/main">
+              <a14:hiddenFill xmlns:a14="http://schemas.microsoft.com/office/drawing/2010/main" xmlns="">
                 <a:solidFill>
                   <a:srgbClr val="FFFFFF"/>
                 </a:solidFill>
@@ -25050,7 +25050,7 @@
     </p:spTree>
     <p:extLst>
       <p:ext uri="{BB962C8B-B14F-4D97-AF65-F5344CB8AC3E}">
-        <p14:creationId xmlns:p14="http://schemas.microsoft.com/office/powerpoint/2010/main" val="2611568421"/>
+        <p14:creationId xmlns:p14="http://schemas.microsoft.com/office/powerpoint/2010/main" xmlns="" val="2611568421"/>
       </p:ext>
     </p:extLst>
   </p:cSld>
@@ -25268,7 +25268,15 @@
             </a:pPr>
             <a:r>
               <a:rPr lang="nl-NL" dirty="0"/>
-              <a:t>De auto beweegt vakje per vakje met een kans van 80%</a:t>
+              <a:t>De auto beweegt vakje per vakje met een kans van </a:t>
+            </a:r>
+            <a:r>
+              <a:rPr lang="nl-NL" dirty="0" smtClean="0"/>
+              <a:t>50</a:t>
+            </a:r>
+            <a:r>
+              <a:rPr lang="nl-NL" dirty="0"/>
+              <a:t>%</a:t>
             </a:r>
           </a:p>
           <a:p>
@@ -25385,28 +25393,28 @@
                 <a:gridCol w="1822550">
                   <a:extLst>
                     <a:ext uri="{9D8B030D-6E8A-4147-A177-3AD203B41FA5}">
-                      <a16:colId xmlns:a16="http://schemas.microsoft.com/office/drawing/2014/main" val="20000"/>
+                      <a16:colId xmlns:a16="http://schemas.microsoft.com/office/drawing/2014/main" xmlns="" val="20000"/>
                     </a:ext>
                   </a:extLst>
                 </a:gridCol>
                 <a:gridCol w="1822550">
                   <a:extLst>
                     <a:ext uri="{9D8B030D-6E8A-4147-A177-3AD203B41FA5}">
-                      <a16:colId xmlns:a16="http://schemas.microsoft.com/office/drawing/2014/main" val="20001"/>
+                      <a16:colId xmlns:a16="http://schemas.microsoft.com/office/drawing/2014/main" xmlns="" val="20001"/>
                     </a:ext>
                   </a:extLst>
                 </a:gridCol>
                 <a:gridCol w="1822550">
                   <a:extLst>
                     <a:ext uri="{9D8B030D-6E8A-4147-A177-3AD203B41FA5}">
-                      <a16:colId xmlns:a16="http://schemas.microsoft.com/office/drawing/2014/main" val="20002"/>
+                      <a16:colId xmlns:a16="http://schemas.microsoft.com/office/drawing/2014/main" xmlns="" val="20002"/>
                     </a:ext>
                   </a:extLst>
                 </a:gridCol>
                 <a:gridCol w="1822550">
                   <a:extLst>
                     <a:ext uri="{9D8B030D-6E8A-4147-A177-3AD203B41FA5}">
-                      <a16:colId xmlns:a16="http://schemas.microsoft.com/office/drawing/2014/main" val="20003"/>
+                      <a16:colId xmlns:a16="http://schemas.microsoft.com/office/drawing/2014/main" xmlns="" val="20003"/>
                     </a:ext>
                   </a:extLst>
                 </a:gridCol>
@@ -25463,7 +25471,7 @@
                 </a:tc>
                 <a:extLst>
                   <a:ext uri="{0D108BD9-81ED-4DB2-BD59-A6C34878D82A}">
-                    <a16:rowId xmlns:a16="http://schemas.microsoft.com/office/drawing/2014/main" val="10000"/>
+                    <a16:rowId xmlns:a16="http://schemas.microsoft.com/office/drawing/2014/main" xmlns="" val="10000"/>
                   </a:ext>
                 </a:extLst>
               </a:tr>
@@ -25522,7 +25530,7 @@
                 </a:tc>
                 <a:extLst>
                   <a:ext uri="{0D108BD9-81ED-4DB2-BD59-A6C34878D82A}">
-                    <a16:rowId xmlns:a16="http://schemas.microsoft.com/office/drawing/2014/main" val="10001"/>
+                    <a16:rowId xmlns:a16="http://schemas.microsoft.com/office/drawing/2014/main" xmlns="" val="10001"/>
                   </a:ext>
                 </a:extLst>
               </a:tr>
@@ -25581,7 +25589,7 @@
                 </a:tc>
                 <a:extLst>
                   <a:ext uri="{0D108BD9-81ED-4DB2-BD59-A6C34878D82A}">
-                    <a16:rowId xmlns:a16="http://schemas.microsoft.com/office/drawing/2014/main" val="10002"/>
+                    <a16:rowId xmlns:a16="http://schemas.microsoft.com/office/drawing/2014/main" xmlns="" val="10002"/>
                   </a:ext>
                 </a:extLst>
               </a:tr>
@@ -25645,7 +25653,7 @@
                 </a:tc>
                 <a:extLst>
                   <a:ext uri="{0D108BD9-81ED-4DB2-BD59-A6C34878D82A}">
-                    <a16:rowId xmlns:a16="http://schemas.microsoft.com/office/drawing/2014/main" val="10003"/>
+                    <a16:rowId xmlns:a16="http://schemas.microsoft.com/office/drawing/2014/main" xmlns="" val="10003"/>
                   </a:ext>
                 </a:extLst>
               </a:tr>
@@ -25704,7 +25712,7 @@
                 </a:tc>
                 <a:extLst>
                   <a:ext uri="{0D108BD9-81ED-4DB2-BD59-A6C34878D82A}">
-                    <a16:rowId xmlns:a16="http://schemas.microsoft.com/office/drawing/2014/main" val="10004"/>
+                    <a16:rowId xmlns:a16="http://schemas.microsoft.com/office/drawing/2014/main" xmlns="" val="10004"/>
                   </a:ext>
                 </a:extLst>
               </a:tr>
@@ -25734,28 +25742,28 @@
                 <a:gridCol w="1822550">
                   <a:extLst>
                     <a:ext uri="{9D8B030D-6E8A-4147-A177-3AD203B41FA5}">
-                      <a16:colId xmlns:a16="http://schemas.microsoft.com/office/drawing/2014/main" val="20000"/>
+                      <a16:colId xmlns:a16="http://schemas.microsoft.com/office/drawing/2014/main" xmlns="" val="20000"/>
                     </a:ext>
                   </a:extLst>
                 </a:gridCol>
                 <a:gridCol w="1822550">
                   <a:extLst>
                     <a:ext uri="{9D8B030D-6E8A-4147-A177-3AD203B41FA5}">
-                      <a16:colId xmlns:a16="http://schemas.microsoft.com/office/drawing/2014/main" val="20001"/>
+                      <a16:colId xmlns:a16="http://schemas.microsoft.com/office/drawing/2014/main" xmlns="" val="20001"/>
                     </a:ext>
                   </a:extLst>
                 </a:gridCol>
                 <a:gridCol w="1822550">
                   <a:extLst>
                     <a:ext uri="{9D8B030D-6E8A-4147-A177-3AD203B41FA5}">
-                      <a16:colId xmlns:a16="http://schemas.microsoft.com/office/drawing/2014/main" val="20002"/>
+                      <a16:colId xmlns:a16="http://schemas.microsoft.com/office/drawing/2014/main" xmlns="" val="20002"/>
                     </a:ext>
                   </a:extLst>
                 </a:gridCol>
                 <a:gridCol w="1822550">
                   <a:extLst>
                     <a:ext uri="{9D8B030D-6E8A-4147-A177-3AD203B41FA5}">
-                      <a16:colId xmlns:a16="http://schemas.microsoft.com/office/drawing/2014/main" val="20003"/>
+                      <a16:colId xmlns:a16="http://schemas.microsoft.com/office/drawing/2014/main" xmlns="" val="20003"/>
                     </a:ext>
                   </a:extLst>
                 </a:gridCol>
@@ -25812,7 +25820,7 @@
                 </a:tc>
                 <a:extLst>
                   <a:ext uri="{0D108BD9-81ED-4DB2-BD59-A6C34878D82A}">
-                    <a16:rowId xmlns:a16="http://schemas.microsoft.com/office/drawing/2014/main" val="10000"/>
+                    <a16:rowId xmlns:a16="http://schemas.microsoft.com/office/drawing/2014/main" xmlns="" val="10000"/>
                   </a:ext>
                 </a:extLst>
               </a:tr>
@@ -25876,7 +25884,7 @@
                 </a:tc>
                 <a:extLst>
                   <a:ext uri="{0D108BD9-81ED-4DB2-BD59-A6C34878D82A}">
-                    <a16:rowId xmlns:a16="http://schemas.microsoft.com/office/drawing/2014/main" val="10001"/>
+                    <a16:rowId xmlns:a16="http://schemas.microsoft.com/office/drawing/2014/main" xmlns="" val="10001"/>
                   </a:ext>
                 </a:extLst>
               </a:tr>
@@ -25935,7 +25943,7 @@
                 </a:tc>
                 <a:extLst>
                   <a:ext uri="{0D108BD9-81ED-4DB2-BD59-A6C34878D82A}">
-                    <a16:rowId xmlns:a16="http://schemas.microsoft.com/office/drawing/2014/main" val="10002"/>
+                    <a16:rowId xmlns:a16="http://schemas.microsoft.com/office/drawing/2014/main" xmlns="" val="10002"/>
                   </a:ext>
                 </a:extLst>
               </a:tr>
@@ -25999,7 +26007,7 @@
                 </a:tc>
                 <a:extLst>
                   <a:ext uri="{0D108BD9-81ED-4DB2-BD59-A6C34878D82A}">
-                    <a16:rowId xmlns:a16="http://schemas.microsoft.com/office/drawing/2014/main" val="10003"/>
+                    <a16:rowId xmlns:a16="http://schemas.microsoft.com/office/drawing/2014/main" xmlns="" val="10003"/>
                   </a:ext>
                 </a:extLst>
               </a:tr>
@@ -26063,7 +26071,7 @@
                 </a:tc>
                 <a:extLst>
                   <a:ext uri="{0D108BD9-81ED-4DB2-BD59-A6C34878D82A}">
-                    <a16:rowId xmlns:a16="http://schemas.microsoft.com/office/drawing/2014/main" val="10004"/>
+                    <a16:rowId xmlns:a16="http://schemas.microsoft.com/office/drawing/2014/main" xmlns="" val="10004"/>
                   </a:ext>
                 </a:extLst>
               </a:tr>
@@ -26974,7 +26982,7 @@
   <a:extraClrSchemeLst/>
   <a:extLst>
     <a:ext uri="{05A4C25C-085E-4340-85A3-A5531E510DB2}">
-      <thm15:themeFamily xmlns:thm15="http://schemas.microsoft.com/office/thememl/2012/main" name="Office_36804619_TF22378848.potx" id="{2769F241-6BF6-4225-8399-35ED46AD0678}" vid="{DE37C0D3-5988-4A63-B7A3-695D6A227FAA}"/>
+      <thm15:themeFamily xmlns:thm15="http://schemas.microsoft.com/office/thememl/2012/main" xmlns="" name="Office_36804619_TF22378848.potx" id="{2769F241-6BF6-4225-8399-35ED46AD0678}" vid="{DE37C0D3-5988-4A63-B7A3-695D6A227FAA}"/>
     </a:ext>
   </a:extLst>
 </a:theme>
@@ -27269,7 +27277,7 @@
   <a:extraClrSchemeLst/>
   <a:extLst>
     <a:ext uri="{05A4C25C-085E-4340-85A3-A5531E510DB2}">
-      <thm15:themeFamily xmlns:thm15="http://schemas.microsoft.com/office/thememl/2012/main" name="Office Theme" id="{62F939B6-93AF-4DB8-9C6B-D6C7DFDC589F}" vid="{4A3C46E8-61CC-4603-A589-7422A47A8E4A}"/>
+      <thm15:themeFamily xmlns:thm15="http://schemas.microsoft.com/office/thememl/2012/main" xmlns="" name="Office Theme" id="{62F939B6-93AF-4DB8-9C6B-D6C7DFDC589F}" vid="{4A3C46E8-61CC-4603-A589-7422A47A8E4A}"/>
     </a:ext>
   </a:extLst>
 </a:theme>
@@ -27530,30 +27538,13 @@
   <a:extraClrSchemeLst/>
   <a:extLst>
     <a:ext uri="{05A4C25C-085E-4340-85A3-A5531E510DB2}">
-      <thm15:themeFamily xmlns:thm15="http://schemas.microsoft.com/office/thememl/2012/main" name="Office Theme" id="{62F939B6-93AF-4DB8-9C6B-D6C7DFDC589F}" vid="{4A3C46E8-61CC-4603-A589-7422A47A8E4A}"/>
+      <thm15:themeFamily xmlns:thm15="http://schemas.microsoft.com/office/thememl/2012/main" xmlns="" name="Office Theme" id="{62F939B6-93AF-4DB8-9C6B-D6C7DFDC589F}" vid="{4A3C46E8-61CC-4603-A589-7422A47A8E4A}"/>
     </a:ext>
   </a:extLst>
 </a:theme>
 </file>
 
 <file path=customXml/item1.xml><?xml version="1.0" encoding="utf-8"?>
-<p:properties xmlns:p="http://schemas.microsoft.com/office/2006/metadata/properties" xmlns:xsi="http://www.w3.org/2001/XMLSchema-instance" xmlns:pc="http://schemas.microsoft.com/office/infopath/2007/PartnerControls">
-  <documentManagement>
-    <MediaServiceKeyPoints xmlns="71af3243-3dd4-4a8d-8c0d-dd76da1f02a5" xsi:nil="true"/>
-  </documentManagement>
-</p:properties>
-</file>
-
-<file path=customXml/item2.xml><?xml version="1.0" encoding="utf-8"?>
-<?mso-contentType ?>
-<FormTemplates xmlns="http://schemas.microsoft.com/sharepoint/v3/contenttype/forms">
-  <Display>DocumentLibraryForm</Display>
-  <Edit>DocumentLibraryForm</Edit>
-  <New>DocumentLibraryForm</New>
-</FormTemplates>
-</file>
-
-<file path=customXml/item3.xml><?xml version="1.0" encoding="utf-8"?>
 <ct:contentTypeSchema xmlns:ct="http://schemas.microsoft.com/office/2006/metadata/contentType" xmlns:ma="http://schemas.microsoft.com/office/2006/metadata/properties/metaAttributes" ct:_="" ma:_="" ma:contentTypeName="Document" ma:contentTypeID="0x01010079F111ED35F8CC479449609E8A0923A6" ma:contentTypeVersion="11" ma:contentTypeDescription="Create a new document." ma:contentTypeScope="" ma:versionID="9677210f24a1be23c92c90fd886aa0aa">
   <xsd:schema xmlns:xsd="http://www.w3.org/2001/XMLSchema" xmlns:xs="http://www.w3.org/2001/XMLSchema" xmlns:p="http://schemas.microsoft.com/office/2006/metadata/properties" xmlns:ns2="71af3243-3dd4-4a8d-8c0d-dd76da1f02a5" xmlns:ns3="16c05727-aa75-4e4a-9b5f-8a80a1165891" targetNamespace="http://schemas.microsoft.com/office/2006/metadata/properties" ma:root="true" ma:fieldsID="60e05723c5c1908df1a1a4ebf11d344e" ns2:_="" ns3:_="">
     <xsd:import namespace="71af3243-3dd4-4a8d-8c0d-dd76da1f02a5"/>
@@ -27764,25 +27755,24 @@
 </ct:contentTypeSchema>
 </file>
 
-<file path=customXml/itemProps1.xml><?xml version="1.0" encoding="utf-8"?>
-<ds:datastoreItem xmlns:ds="http://schemas.openxmlformats.org/officeDocument/2006/customXml" ds:itemID="{788A2F88-55C5-4ED1-9541-807C65424763}">
-  <ds:schemaRefs>
-    <ds:schemaRef ds:uri="http://schemas.microsoft.com/office/2006/metadata/properties"/>
-    <ds:schemaRef ds:uri="http://schemas.microsoft.com/office/infopath/2007/PartnerControls"/>
-    <ds:schemaRef ds:uri="71af3243-3dd4-4a8d-8c0d-dd76da1f02a5"/>
-  </ds:schemaRefs>
-</ds:datastoreItem>
+<file path=customXml/item2.xml><?xml version="1.0" encoding="utf-8"?>
+<?mso-contentType ?>
+<FormTemplates xmlns="http://schemas.microsoft.com/sharepoint/v3/contenttype/forms">
+  <Display>DocumentLibraryForm</Display>
+  <Edit>DocumentLibraryForm</Edit>
+  <New>DocumentLibraryForm</New>
+</FormTemplates>
 </file>
 
-<file path=customXml/itemProps2.xml><?xml version="1.0" encoding="utf-8"?>
-<ds:datastoreItem xmlns:ds="http://schemas.openxmlformats.org/officeDocument/2006/customXml" ds:itemID="{4F44C90D-2A62-4985-9618-3460247437B1}">
-  <ds:schemaRefs>
-    <ds:schemaRef ds:uri="http://schemas.microsoft.com/sharepoint/v3/contenttype/forms"/>
-  </ds:schemaRefs>
-</ds:datastoreItem>
+<file path=customXml/item3.xml><?xml version="1.0" encoding="utf-8"?>
+<p:properties xmlns:p="http://schemas.microsoft.com/office/2006/metadata/properties" xmlns:xsi="http://www.w3.org/2001/XMLSchema-instance" xmlns:pc="http://schemas.microsoft.com/office/infopath/2007/PartnerControls">
+  <documentManagement>
+    <MediaServiceKeyPoints xmlns="71af3243-3dd4-4a8d-8c0d-dd76da1f02a5" xsi:nil="true"/>
+  </documentManagement>
+</p:properties>
 </file>
 
-<file path=customXml/itemProps3.xml><?xml version="1.0" encoding="utf-8"?>
+<file path=customXml/itemProps1.xml><?xml version="1.0" encoding="utf-8"?>
 <ds:datastoreItem xmlns:ds="http://schemas.openxmlformats.org/officeDocument/2006/customXml" ds:itemID="{B61EAB5F-88FC-4FAE-AE3C-037A3C365EB8}">
   <ds:schemaRefs>
     <ds:schemaRef ds:uri="http://schemas.microsoft.com/office/2006/metadata/contentType"/>
@@ -27799,4 +27789,22 @@
     <ds:schemaRef ds:uri="http://schemas.microsoft.com/internal/obd"/>
   </ds:schemaRefs>
 </ds:datastoreItem>
+</file>
+
+<file path=customXml/itemProps2.xml><?xml version="1.0" encoding="utf-8"?>
+<ds:datastoreItem xmlns:ds="http://schemas.openxmlformats.org/officeDocument/2006/customXml" ds:itemID="{4F44C90D-2A62-4985-9618-3460247437B1}">
+  <ds:schemaRefs>
+    <ds:schemaRef ds:uri="http://schemas.microsoft.com/sharepoint/v3/contenttype/forms"/>
+  </ds:schemaRefs>
+</ds:datastoreItem>
+</file>
+
+<file path=customXml/itemProps3.xml><?xml version="1.0" encoding="utf-8"?>
+<ds:datastoreItem xmlns:ds="http://schemas.openxmlformats.org/officeDocument/2006/customXml" ds:itemID="{788A2F88-55C5-4ED1-9541-807C65424763}">
+  <ds:schemaRefs>
+    <ds:schemaRef ds:uri="http://schemas.microsoft.com/office/2006/metadata/properties"/>
+    <ds:schemaRef ds:uri="http://schemas.microsoft.com/office/infopath/2007/PartnerControls"/>
+    <ds:schemaRef ds:uri="71af3243-3dd4-4a8d-8c0d-dd76da1f02a5"/>
+  </ds:schemaRefs>
+</ds:datastoreItem>
 </file>
</xml_diff>